<commit_message>
updates to default runtime docbkx guide
git-svn-id: https://svn.apache.org/repos/asf/incubator/isis/trunk@1135303 13f79535-47bb-0310-9956-ffa450edef68
</commit_message>
<xml_diff>
--- a/runtimes/dflt/src/docbkx/guide/images/architecture.pptx
+++ b/runtimes/dflt/src/docbkx/guide/images/architecture.pptx
@@ -289,7 +289,7 @@
             <a:fld id="{E619CF07-5341-4F8E-8F5C-B8A988D2EA37}" type="datetimeFigureOut">
               <a:rPr lang="en-US" smtClean="0"/>
               <a:pPr/>
-              <a:t>11/27/2010</a:t>
+              <a:t>6/13/2011</a:t>
             </a:fld>
             <a:endParaRPr lang="en-GB"/>
           </a:p>
@@ -456,7 +456,7 @@
             <a:fld id="{E619CF07-5341-4F8E-8F5C-B8A988D2EA37}" type="datetimeFigureOut">
               <a:rPr lang="en-US" smtClean="0"/>
               <a:pPr/>
-              <a:t>11/27/2010</a:t>
+              <a:t>6/13/2011</a:t>
             </a:fld>
             <a:endParaRPr lang="en-GB"/>
           </a:p>
@@ -633,7 +633,7 @@
             <a:fld id="{E619CF07-5341-4F8E-8F5C-B8A988D2EA37}" type="datetimeFigureOut">
               <a:rPr lang="en-US" smtClean="0"/>
               <a:pPr/>
-              <a:t>11/27/2010</a:t>
+              <a:t>6/13/2011</a:t>
             </a:fld>
             <a:endParaRPr lang="en-GB"/>
           </a:p>
@@ -800,7 +800,7 @@
             <a:fld id="{E619CF07-5341-4F8E-8F5C-B8A988D2EA37}" type="datetimeFigureOut">
               <a:rPr lang="en-US" smtClean="0"/>
               <a:pPr/>
-              <a:t>11/27/2010</a:t>
+              <a:t>6/13/2011</a:t>
             </a:fld>
             <a:endParaRPr lang="en-GB"/>
           </a:p>
@@ -1043,7 +1043,7 @@
             <a:fld id="{E619CF07-5341-4F8E-8F5C-B8A988D2EA37}" type="datetimeFigureOut">
               <a:rPr lang="en-US" smtClean="0"/>
               <a:pPr/>
-              <a:t>11/27/2010</a:t>
+              <a:t>6/13/2011</a:t>
             </a:fld>
             <a:endParaRPr lang="en-GB"/>
           </a:p>
@@ -1328,7 +1328,7 @@
             <a:fld id="{E619CF07-5341-4F8E-8F5C-B8A988D2EA37}" type="datetimeFigureOut">
               <a:rPr lang="en-US" smtClean="0"/>
               <a:pPr/>
-              <a:t>11/27/2010</a:t>
+              <a:t>6/13/2011</a:t>
             </a:fld>
             <a:endParaRPr lang="en-GB"/>
           </a:p>
@@ -1747,7 +1747,7 @@
             <a:fld id="{E619CF07-5341-4F8E-8F5C-B8A988D2EA37}" type="datetimeFigureOut">
               <a:rPr lang="en-US" smtClean="0"/>
               <a:pPr/>
-              <a:t>11/27/2010</a:t>
+              <a:t>6/13/2011</a:t>
             </a:fld>
             <a:endParaRPr lang="en-GB"/>
           </a:p>
@@ -1862,7 +1862,7 @@
             <a:fld id="{E619CF07-5341-4F8E-8F5C-B8A988D2EA37}" type="datetimeFigureOut">
               <a:rPr lang="en-US" smtClean="0"/>
               <a:pPr/>
-              <a:t>11/27/2010</a:t>
+              <a:t>6/13/2011</a:t>
             </a:fld>
             <a:endParaRPr lang="en-GB"/>
           </a:p>
@@ -1954,7 +1954,7 @@
             <a:fld id="{E619CF07-5341-4F8E-8F5C-B8A988D2EA37}" type="datetimeFigureOut">
               <a:rPr lang="en-US" smtClean="0"/>
               <a:pPr/>
-              <a:t>11/27/2010</a:t>
+              <a:t>6/13/2011</a:t>
             </a:fld>
             <a:endParaRPr lang="en-GB"/>
           </a:p>
@@ -2228,7 +2228,7 @@
             <a:fld id="{E619CF07-5341-4F8E-8F5C-B8A988D2EA37}" type="datetimeFigureOut">
               <a:rPr lang="en-US" smtClean="0"/>
               <a:pPr/>
-              <a:t>11/27/2010</a:t>
+              <a:t>6/13/2011</a:t>
             </a:fld>
             <a:endParaRPr lang="en-GB"/>
           </a:p>
@@ -2478,7 +2478,7 @@
             <a:fld id="{E619CF07-5341-4F8E-8F5C-B8A988D2EA37}" type="datetimeFigureOut">
               <a:rPr lang="en-US" smtClean="0"/>
               <a:pPr/>
-              <a:t>11/27/2010</a:t>
+              <a:t>6/13/2011</a:t>
             </a:fld>
             <a:endParaRPr lang="en-GB"/>
           </a:p>
@@ -2688,7 +2688,7 @@
             <a:fld id="{E619CF07-5341-4F8E-8F5C-B8A988D2EA37}" type="datetimeFigureOut">
               <a:rPr lang="en-US" smtClean="0"/>
               <a:pPr/>
-              <a:t>11/27/2010</a:t>
+              <a:t>6/13/2011</a:t>
             </a:fld>
             <a:endParaRPr lang="en-GB"/>
           </a:p>
@@ -3140,19 +3140,8 @@
           <a:p>
             <a:pPr algn="ctr"/>
             <a:r>
-              <a:rPr lang="en-GB" sz="1600" dirty="0" smtClean="0"/>
-              <a:t>Isis</a:t>
-            </a:r>
-            <a:r>
-              <a:rPr lang="en-GB" sz="1600" dirty="0" smtClean="0"/>
-              <a:t/>
-            </a:r>
-            <a:br>
-              <a:rPr lang="en-GB" sz="1600" dirty="0" smtClean="0"/>
-            </a:br>
-            <a:r>
               <a:rPr lang="en-GB" sz="1600" dirty="0" err="1" smtClean="0"/>
-              <a:t>SessionFactory</a:t>
+              <a:t>IsisSessionFactory</a:t>
             </a:r>
             <a:endParaRPr lang="en-GB" sz="1600" dirty="0"/>
           </a:p>
@@ -3166,8 +3155,8 @@
         </p:nvSpPr>
         <p:spPr>
           <a:xfrm>
-            <a:off x="509558" y="2563754"/>
-            <a:ext cx="2015328" cy="714380"/>
+            <a:off x="509558" y="2132856"/>
+            <a:ext cx="2015328" cy="570364"/>
           </a:xfrm>
           <a:prstGeom prst="rect">
             <a:avLst/>
@@ -3217,8 +3206,8 @@
         </p:nvSpPr>
         <p:spPr>
           <a:xfrm>
-            <a:off x="500034" y="1706498"/>
-            <a:ext cx="2000264" cy="714380"/>
+            <a:off x="509558" y="1412776"/>
+            <a:ext cx="2000264" cy="570364"/>
           </a:xfrm>
           <a:prstGeom prst="rect">
             <a:avLst/>
@@ -3268,8 +3257,8 @@
         </p:nvSpPr>
         <p:spPr>
           <a:xfrm>
-            <a:off x="357158" y="5849902"/>
-            <a:ext cx="1044662" cy="642942"/>
+            <a:off x="357158" y="5378346"/>
+            <a:ext cx="1044662" cy="570934"/>
           </a:xfrm>
           <a:prstGeom prst="rect">
             <a:avLst/>
@@ -3303,10 +3292,17 @@
           <a:p>
             <a:pPr algn="ctr"/>
             <a:r>
-              <a:rPr lang="en-GB" sz="1600" dirty="0" smtClean="0"/>
-              <a:t>Client</a:t>
-            </a:r>
-            <a:endParaRPr lang="en-GB" sz="1600" dirty="0"/>
+              <a:rPr lang="en-GB" sz="1200" dirty="0" smtClean="0"/>
+              <a:t>Deployment</a:t>
+            </a:r>
+            <a:br>
+              <a:rPr lang="en-GB" sz="1200" dirty="0" smtClean="0"/>
+            </a:br>
+            <a:r>
+              <a:rPr lang="en-GB" sz="1200" dirty="0" smtClean="0"/>
+              <a:t>Type</a:t>
+            </a:r>
+            <a:endParaRPr lang="en-GB" sz="1200" dirty="0"/>
           </a:p>
         </p:txBody>
       </p:sp>
@@ -3318,8 +3314,8 @@
         </p:nvSpPr>
         <p:spPr>
           <a:xfrm>
-            <a:off x="1598512" y="5849902"/>
-            <a:ext cx="1044662" cy="642942"/>
+            <a:off x="1598512" y="5378346"/>
+            <a:ext cx="1044662" cy="570934"/>
           </a:xfrm>
           <a:prstGeom prst="rect">
             <a:avLst/>
@@ -3353,17 +3349,17 @@
           <a:p>
             <a:pPr algn="ctr"/>
             <a:r>
-              <a:rPr lang="en-GB" sz="1600" dirty="0" smtClean="0"/>
-              <a:t>Server</a:t>
+              <a:rPr lang="en-GB" sz="1200" dirty="0" smtClean="0"/>
+              <a:t>Isis</a:t>
             </a:r>
             <a:br>
-              <a:rPr lang="en-GB" sz="1600" dirty="0" smtClean="0"/>
+              <a:rPr lang="en-GB" sz="1200" dirty="0" smtClean="0"/>
             </a:br>
             <a:r>
-              <a:rPr lang="en-GB" sz="1600" dirty="0" smtClean="0"/>
-              <a:t>Listeners</a:t>
-            </a:r>
-            <a:endParaRPr lang="en-GB" sz="1600" dirty="0"/>
+              <a:rPr lang="en-GB" sz="1200" dirty="0" smtClean="0"/>
+              <a:t>Configuration</a:t>
+            </a:r>
+            <a:endParaRPr lang="en-GB" sz="1200" dirty="0"/>
           </a:p>
         </p:txBody>
       </p:sp>
@@ -3375,8 +3371,8 @@
         </p:nvSpPr>
         <p:spPr>
           <a:xfrm>
-            <a:off x="500853" y="4286256"/>
-            <a:ext cx="1999445" cy="714380"/>
+            <a:off x="509558" y="4232498"/>
+            <a:ext cx="1999445" cy="420638"/>
           </a:xfrm>
           <a:prstGeom prst="rect">
             <a:avLst/>
@@ -3410,17 +3406,14 @@
           <a:p>
             <a:pPr algn="ctr"/>
             <a:r>
-              <a:rPr lang="en-GB" sz="1600" dirty="0" smtClean="0"/>
-              <a:t>Template</a:t>
-            </a:r>
-            <a:br>
-              <a:rPr lang="en-GB" sz="1600" dirty="0" smtClean="0"/>
-            </a:br>
-            <a:r>
-              <a:rPr lang="en-GB" sz="1600" dirty="0" err="1" smtClean="0"/>
+              <a:rPr lang="en-GB" sz="1400" dirty="0" smtClean="0"/>
+              <a:t>Template </a:t>
+            </a:r>
+            <a:r>
+              <a:rPr lang="en-GB" sz="1400" dirty="0" err="1" smtClean="0"/>
               <a:t>ImageLoader</a:t>
             </a:r>
-            <a:endParaRPr lang="en-GB" sz="1600" dirty="0"/>
+            <a:endParaRPr lang="en-GB" sz="1400" dirty="0"/>
           </a:p>
         </p:txBody>
       </p:sp>
@@ -3708,14 +3701,14 @@
             <a:pPr algn="ctr"/>
             <a:r>
               <a:rPr lang="en-GB" sz="1600" dirty="0" smtClean="0"/>
-              <a:t>Perspective</a:t>
+              <a:t>User</a:t>
             </a:r>
             <a:br>
               <a:rPr lang="en-GB" sz="1600" dirty="0" smtClean="0"/>
             </a:br>
             <a:r>
               <a:rPr lang="en-GB" sz="1600" dirty="0" smtClean="0"/>
-              <a:t>Locator</a:t>
+              <a:t>Profile</a:t>
             </a:r>
             <a:endParaRPr lang="en-GB" sz="1600" dirty="0"/>
           </a:p>
@@ -3915,7 +3908,7 @@
             <a:pPr algn="ctr"/>
             <a:r>
               <a:rPr lang="en-GB" sz="1600" dirty="0" err="1" smtClean="0"/>
-              <a:t>IdentityMap</a:t>
+              <a:t>AdapterManager</a:t>
             </a:r>
             <a:endParaRPr lang="en-GB" sz="1600" dirty="0"/>
           </a:p>
@@ -4190,8 +4183,8 @@
         </p:nvSpPr>
         <p:spPr>
           <a:xfrm>
-            <a:off x="6215074" y="5035282"/>
-            <a:ext cx="2531334" cy="1600438"/>
+            <a:off x="6047986" y="5570656"/>
+            <a:ext cx="2988510" cy="738664"/>
           </a:xfrm>
           <a:prstGeom prst="rect">
             <a:avLst/>
@@ -4206,82 +4199,37 @@
           <a:p>
             <a:r>
               <a:rPr lang="en-GB" sz="1400" dirty="0" smtClean="0"/>
-              <a:t>Some components not shown,</a:t>
+              <a:t>The object-store implementation</a:t>
             </a:r>
             <a:br>
               <a:rPr lang="en-GB" sz="1400" dirty="0" smtClean="0"/>
             </a:br>
             <a:r>
               <a:rPr lang="en-GB" sz="1400" dirty="0" smtClean="0"/>
-              <a:t>including:</a:t>
-            </a:r>
-          </a:p>
-          <a:p>
-            <a:pPr>
-              <a:buFont typeface="Wingdings" pitchFamily="2" charset="2"/>
-              <a:buChar char="§"/>
-            </a:pPr>
+              <a:t>of </a:t>
+            </a:r>
+            <a:r>
+              <a:rPr lang="en-GB" sz="1400" dirty="0" err="1" smtClean="0"/>
+              <a:t>PersistenceSession</a:t>
+            </a:r>
             <a:r>
               <a:rPr lang="en-GB" sz="1400" dirty="0" smtClean="0"/>
-              <a:t> fixture installer</a:t>
-            </a:r>
-          </a:p>
-          <a:p>
-            <a:pPr>
-              <a:buFont typeface="Wingdings" pitchFamily="2" charset="2"/>
-              <a:buChar char="§"/>
-            </a:pPr>
-            <a:r>
-              <a:rPr lang="en-GB" sz="1400" dirty="0" smtClean="0"/>
-              <a:t> </a:t>
-            </a:r>
-            <a:r>
-              <a:rPr lang="en-GB" sz="1400" dirty="0" err="1" smtClean="0"/>
-              <a:t>objectstore</a:t>
-            </a:r>
-            <a:r>
-              <a:rPr lang="en-GB" sz="1400" dirty="0" smtClean="0"/>
-              <a:t> &amp; </a:t>
-            </a:r>
-            <a:r>
-              <a:rPr lang="en-GB" sz="1400" dirty="0" err="1" smtClean="0"/>
-              <a:t>persistalgorithm</a:t>
-            </a:r>
-            <a:r>
-              <a:rPr lang="en-GB" sz="1400" dirty="0" smtClean="0"/>
-              <a:t/>
+              <a:t> has additional</a:t>
             </a:r>
             <a:br>
               <a:rPr lang="en-GB" sz="1400" dirty="0" smtClean="0"/>
             </a:br>
             <a:r>
               <a:rPr lang="en-GB" sz="1400" dirty="0" smtClean="0"/>
-              <a:t>   (for </a:t>
+              <a:t>components (notably the </a:t>
             </a:r>
             <a:r>
               <a:rPr lang="en-GB" sz="1400" dirty="0" err="1" smtClean="0"/>
-              <a:t>serverside</a:t>
+              <a:t>ObjectStore</a:t>
             </a:r>
             <a:r>
               <a:rPr lang="en-GB" sz="1400" dirty="0" smtClean="0"/>
               <a:t>)</a:t>
-            </a:r>
-          </a:p>
-          <a:p>
-            <a:pPr>
-              <a:buFont typeface="Wingdings" pitchFamily="2" charset="2"/>
-              <a:buChar char="§"/>
-            </a:pPr>
-            <a:r>
-              <a:rPr lang="en-GB" sz="1400" dirty="0" smtClean="0"/>
-              <a:t> distribution &amp; encoder</a:t>
-            </a:r>
-            <a:br>
-              <a:rPr lang="en-GB" sz="1400" dirty="0" smtClean="0"/>
-            </a:br>
-            <a:r>
-              <a:rPr lang="en-GB" sz="1400" dirty="0" smtClean="0"/>
-              <a:t>   (for client-side)</a:t>
             </a:r>
           </a:p>
         </p:txBody>
@@ -4381,8 +4329,8 @@
         </p:nvSpPr>
         <p:spPr>
           <a:xfrm>
-            <a:off x="509558" y="3429000"/>
-            <a:ext cx="1990740" cy="714380"/>
+            <a:off x="509558" y="3501008"/>
+            <a:ext cx="1990740" cy="570364"/>
           </a:xfrm>
           <a:prstGeom prst="rect">
             <a:avLst/>
@@ -4416,9 +4364,17 @@
           <a:p>
             <a:pPr algn="ctr"/>
             <a:r>
-              <a:rPr lang="en-GB" sz="1600" dirty="0"/>
-              <a:t>Reflector</a:t>
-            </a:r>
+              <a:rPr lang="en-GB" sz="1600" dirty="0" smtClean="0"/>
+              <a:t>Specification</a:t>
+            </a:r>
+            <a:br>
+              <a:rPr lang="en-GB" sz="1600" dirty="0" smtClean="0"/>
+            </a:br>
+            <a:r>
+              <a:rPr lang="en-GB" sz="1600" dirty="0" smtClean="0"/>
+              <a:t>Loader</a:t>
+            </a:r>
+            <a:endParaRPr lang="en-GB" sz="1600" dirty="0"/>
           </a:p>
         </p:txBody>
       </p:sp>
@@ -4495,6 +4451,701 @@
                 </a:schemeClr>
               </a:gs>
               <a:gs pos="50000">
+                <a:schemeClr val="accent1">
+                  <a:tint val="44500"/>
+                  <a:satMod val="160000"/>
+                </a:schemeClr>
+              </a:gs>
+              <a:gs pos="100000">
+                <a:schemeClr val="accent1">
+                  <a:tint val="23500"/>
+                  <a:satMod val="160000"/>
+                </a:schemeClr>
+              </a:gs>
+            </a:gsLst>
+            <a:lin ang="0" scaled="1"/>
+            <a:tileRect/>
+          </a:gradFill>
+          <a:ln>
+            <a:noFill/>
+          </a:ln>
+        </p:spPr>
+        <p:style>
+          <a:lnRef idx="2">
+            <a:schemeClr val="accent1">
+              <a:shade val="50000"/>
+            </a:schemeClr>
+          </a:lnRef>
+          <a:fillRef idx="1">
+            <a:schemeClr val="accent1"/>
+          </a:fillRef>
+          <a:effectRef idx="0">
+            <a:schemeClr val="accent1"/>
+          </a:effectRef>
+          <a:fontRef idx="minor">
+            <a:schemeClr val="lt1"/>
+          </a:fontRef>
+        </p:style>
+        <p:txBody>
+          <a:bodyPr rtlCol="0" anchor="ctr"/>
+          <a:lstStyle/>
+          <a:p>
+            <a:pPr algn="ctr"/>
+            <a:endParaRPr lang="en-GB"/>
+          </a:p>
+        </p:txBody>
+      </p:sp>
+      <p:sp>
+        <p:nvSpPr>
+          <p:cNvPr id="29" name="Rectangle 28"/>
+          <p:cNvSpPr/>
+          <p:nvPr/>
+        </p:nvSpPr>
+        <p:spPr>
+          <a:xfrm>
+            <a:off x="357158" y="6038757"/>
+            <a:ext cx="1044662" cy="486587"/>
+          </a:xfrm>
+          <a:prstGeom prst="rect">
+            <a:avLst/>
+          </a:prstGeom>
+          <a:solidFill>
+            <a:schemeClr val="accent1">
+              <a:lumMod val="60000"/>
+              <a:lumOff val="40000"/>
+            </a:schemeClr>
+          </a:solidFill>
+        </p:spPr>
+        <p:style>
+          <a:lnRef idx="2">
+            <a:schemeClr val="accent1">
+              <a:shade val="50000"/>
+            </a:schemeClr>
+          </a:lnRef>
+          <a:fillRef idx="1">
+            <a:schemeClr val="accent1"/>
+          </a:fillRef>
+          <a:effectRef idx="0">
+            <a:schemeClr val="accent1"/>
+          </a:effectRef>
+          <a:fontRef idx="minor">
+            <a:schemeClr val="lt1"/>
+          </a:fontRef>
+        </p:style>
+        <p:txBody>
+          <a:bodyPr rtlCol="0" anchor="ctr" anchorCtr="0"/>
+          <a:lstStyle/>
+          <a:p>
+            <a:pPr algn="ctr"/>
+            <a:r>
+              <a:rPr lang="en-GB" sz="1200" dirty="0" smtClean="0"/>
+              <a:t>Logon</a:t>
+            </a:r>
+            <a:br>
+              <a:rPr lang="en-GB" sz="1200" dirty="0" smtClean="0"/>
+            </a:br>
+            <a:r>
+              <a:rPr lang="en-GB" sz="1200" dirty="0" smtClean="0"/>
+              <a:t>Fixture</a:t>
+            </a:r>
+            <a:endParaRPr lang="en-GB" sz="1200" dirty="0"/>
+          </a:p>
+        </p:txBody>
+      </p:sp>
+      <p:sp>
+        <p:nvSpPr>
+          <p:cNvPr id="32" name="Rectangle 31"/>
+          <p:cNvSpPr/>
+          <p:nvPr/>
+        </p:nvSpPr>
+        <p:spPr>
+          <a:xfrm>
+            <a:off x="509558" y="4736554"/>
+            <a:ext cx="1999445" cy="420638"/>
+          </a:xfrm>
+          <a:prstGeom prst="rect">
+            <a:avLst/>
+          </a:prstGeom>
+          <a:solidFill>
+            <a:schemeClr val="accent1">
+              <a:lumMod val="60000"/>
+              <a:lumOff val="40000"/>
+            </a:schemeClr>
+          </a:solidFill>
+        </p:spPr>
+        <p:style>
+          <a:lnRef idx="2">
+            <a:schemeClr val="accent1">
+              <a:shade val="50000"/>
+            </a:schemeClr>
+          </a:lnRef>
+          <a:fillRef idx="1">
+            <a:schemeClr val="accent1"/>
+          </a:fillRef>
+          <a:effectRef idx="0">
+            <a:schemeClr val="accent1"/>
+          </a:effectRef>
+          <a:fontRef idx="minor">
+            <a:schemeClr val="lt1"/>
+          </a:fontRef>
+        </p:style>
+        <p:txBody>
+          <a:bodyPr rtlCol="0" anchor="ctr" anchorCtr="0"/>
+          <a:lstStyle/>
+          <a:p>
+            <a:pPr algn="ctr"/>
+            <a:r>
+              <a:rPr lang="en-GB" sz="1400" dirty="0" err="1" smtClean="0"/>
+              <a:t>UserProfile</a:t>
+            </a:r>
+            <a:r>
+              <a:rPr lang="en-GB" sz="1400" dirty="0" smtClean="0"/>
+              <a:t> Loader</a:t>
+            </a:r>
+            <a:endParaRPr lang="en-GB" sz="1400" dirty="0"/>
+          </a:p>
+        </p:txBody>
+      </p:sp>
+      <p:sp>
+        <p:nvSpPr>
+          <p:cNvPr id="33" name="Rectangle 32"/>
+          <p:cNvSpPr/>
+          <p:nvPr/>
+        </p:nvSpPr>
+        <p:spPr>
+          <a:xfrm>
+            <a:off x="509558" y="2852936"/>
+            <a:ext cx="2000264" cy="509590"/>
+          </a:xfrm>
+          <a:prstGeom prst="rect">
+            <a:avLst/>
+          </a:prstGeom>
+          <a:solidFill>
+            <a:schemeClr val="accent1">
+              <a:lumMod val="60000"/>
+              <a:lumOff val="40000"/>
+            </a:schemeClr>
+          </a:solidFill>
+        </p:spPr>
+        <p:style>
+          <a:lnRef idx="2">
+            <a:schemeClr val="accent1">
+              <a:shade val="50000"/>
+            </a:schemeClr>
+          </a:lnRef>
+          <a:fillRef idx="1">
+            <a:schemeClr val="accent1"/>
+          </a:fillRef>
+          <a:effectRef idx="0">
+            <a:schemeClr val="accent1"/>
+          </a:effectRef>
+          <a:fontRef idx="minor">
+            <a:schemeClr val="lt1"/>
+          </a:fontRef>
+        </p:style>
+        <p:txBody>
+          <a:bodyPr rtlCol="0" anchor="ctr" anchorCtr="0"/>
+          <a:lstStyle/>
+          <a:p>
+            <a:pPr algn="ctr"/>
+            <a:r>
+              <a:rPr lang="en-GB" sz="1400" dirty="0" smtClean="0"/>
+              <a:t>Authorization Manager</a:t>
+            </a:r>
+            <a:endParaRPr lang="en-GB" sz="1400" dirty="0"/>
+          </a:p>
+        </p:txBody>
+      </p:sp>
+      <p:sp>
+        <p:nvSpPr>
+          <p:cNvPr id="35" name="Freeform 34"/>
+          <p:cNvSpPr/>
+          <p:nvPr/>
+        </p:nvSpPr>
+        <p:spPr>
+          <a:xfrm>
+            <a:off x="2519967" y="1063555"/>
+            <a:ext cx="901895" cy="926848"/>
+          </a:xfrm>
+          <a:custGeom>
+            <a:avLst/>
+            <a:gdLst>
+              <a:gd name="connsiteX0" fmla="*/ 0 w 635726"/>
+              <a:gd name="connsiteY0" fmla="*/ 714103 h 6296297"/>
+              <a:gd name="connsiteX1" fmla="*/ 635726 w 635726"/>
+              <a:gd name="connsiteY1" fmla="*/ 0 h 6296297"/>
+              <a:gd name="connsiteX2" fmla="*/ 635726 w 635726"/>
+              <a:gd name="connsiteY2" fmla="*/ 6296297 h 6296297"/>
+              <a:gd name="connsiteX3" fmla="*/ 0 w 635726"/>
+              <a:gd name="connsiteY3" fmla="*/ 4859383 h 6296297"/>
+              <a:gd name="connsiteX4" fmla="*/ 0 w 635726"/>
+              <a:gd name="connsiteY4" fmla="*/ 714103 h 6296297"/>
+              <a:gd name="connsiteX0" fmla="*/ 0 w 793771"/>
+              <a:gd name="connsiteY0" fmla="*/ 726099 h 6308293"/>
+              <a:gd name="connsiteX1" fmla="*/ 793771 w 793771"/>
+              <a:gd name="connsiteY1" fmla="*/ 0 h 6308293"/>
+              <a:gd name="connsiteX2" fmla="*/ 635726 w 793771"/>
+              <a:gd name="connsiteY2" fmla="*/ 6308293 h 6308293"/>
+              <a:gd name="connsiteX3" fmla="*/ 0 w 793771"/>
+              <a:gd name="connsiteY3" fmla="*/ 4871379 h 6308293"/>
+              <a:gd name="connsiteX4" fmla="*/ 0 w 793771"/>
+              <a:gd name="connsiteY4" fmla="*/ 726099 h 6308293"/>
+              <a:gd name="connsiteX0" fmla="*/ 0 w 895371"/>
+              <a:gd name="connsiteY0" fmla="*/ 702108 h 6284302"/>
+              <a:gd name="connsiteX1" fmla="*/ 895371 w 895371"/>
+              <a:gd name="connsiteY1" fmla="*/ 0 h 6284302"/>
+              <a:gd name="connsiteX2" fmla="*/ 635726 w 895371"/>
+              <a:gd name="connsiteY2" fmla="*/ 6284302 h 6284302"/>
+              <a:gd name="connsiteX3" fmla="*/ 0 w 895371"/>
+              <a:gd name="connsiteY3" fmla="*/ 4847388 h 6284302"/>
+              <a:gd name="connsiteX4" fmla="*/ 0 w 895371"/>
+              <a:gd name="connsiteY4" fmla="*/ 702108 h 6284302"/>
+              <a:gd name="connsiteX0" fmla="*/ 11289 w 895371"/>
+              <a:gd name="connsiteY0" fmla="*/ 378231 h 6284302"/>
+              <a:gd name="connsiteX1" fmla="*/ 895371 w 895371"/>
+              <a:gd name="connsiteY1" fmla="*/ 0 h 6284302"/>
+              <a:gd name="connsiteX2" fmla="*/ 635726 w 895371"/>
+              <a:gd name="connsiteY2" fmla="*/ 6284302 h 6284302"/>
+              <a:gd name="connsiteX3" fmla="*/ 0 w 895371"/>
+              <a:gd name="connsiteY3" fmla="*/ 4847388 h 6284302"/>
+              <a:gd name="connsiteX4" fmla="*/ 11289 w 895371"/>
+              <a:gd name="connsiteY4" fmla="*/ 378231 h 6284302"/>
+              <a:gd name="connsiteX0" fmla="*/ 0 w 884082"/>
+              <a:gd name="connsiteY0" fmla="*/ 378231 h 6284302"/>
+              <a:gd name="connsiteX1" fmla="*/ 884082 w 884082"/>
+              <a:gd name="connsiteY1" fmla="*/ 0 h 6284302"/>
+              <a:gd name="connsiteX2" fmla="*/ 624437 w 884082"/>
+              <a:gd name="connsiteY2" fmla="*/ 6284302 h 6284302"/>
+              <a:gd name="connsiteX3" fmla="*/ 0 w 884082"/>
+              <a:gd name="connsiteY3" fmla="*/ 972862 h 6284302"/>
+              <a:gd name="connsiteX4" fmla="*/ 0 w 884082"/>
+              <a:gd name="connsiteY4" fmla="*/ 378231 h 6284302"/>
+              <a:gd name="connsiteX0" fmla="*/ 0 w 884082"/>
+              <a:gd name="connsiteY0" fmla="*/ 378231 h 1306196"/>
+              <a:gd name="connsiteX1" fmla="*/ 884082 w 884082"/>
+              <a:gd name="connsiteY1" fmla="*/ 0 h 1306196"/>
+              <a:gd name="connsiteX2" fmla="*/ 793770 w 884082"/>
+              <a:gd name="connsiteY2" fmla="*/ 1306196 h 1306196"/>
+              <a:gd name="connsiteX3" fmla="*/ 0 w 884082"/>
+              <a:gd name="connsiteY3" fmla="*/ 972862 h 1306196"/>
+              <a:gd name="connsiteX4" fmla="*/ 0 w 884082"/>
+              <a:gd name="connsiteY4" fmla="*/ 378231 h 1306196"/>
+              <a:gd name="connsiteX0" fmla="*/ 0 w 906658"/>
+              <a:gd name="connsiteY0" fmla="*/ 378231 h 972862"/>
+              <a:gd name="connsiteX1" fmla="*/ 884082 w 906658"/>
+              <a:gd name="connsiteY1" fmla="*/ 0 h 972862"/>
+              <a:gd name="connsiteX2" fmla="*/ 906658 w 906658"/>
+              <a:gd name="connsiteY2" fmla="*/ 766401 h 972862"/>
+              <a:gd name="connsiteX3" fmla="*/ 0 w 906658"/>
+              <a:gd name="connsiteY3" fmla="*/ 972862 h 972862"/>
+              <a:gd name="connsiteX4" fmla="*/ 0 w 906658"/>
+              <a:gd name="connsiteY4" fmla="*/ 378231 h 972862"/>
+              <a:gd name="connsiteX0" fmla="*/ 0 w 929237"/>
+              <a:gd name="connsiteY0" fmla="*/ 390227 h 984858"/>
+              <a:gd name="connsiteX1" fmla="*/ 929237 w 929237"/>
+              <a:gd name="connsiteY1" fmla="*/ 0 h 984858"/>
+              <a:gd name="connsiteX2" fmla="*/ 906658 w 929237"/>
+              <a:gd name="connsiteY2" fmla="*/ 778397 h 984858"/>
+              <a:gd name="connsiteX3" fmla="*/ 0 w 929237"/>
+              <a:gd name="connsiteY3" fmla="*/ 984858 h 984858"/>
+              <a:gd name="connsiteX4" fmla="*/ 0 w 929237"/>
+              <a:gd name="connsiteY4" fmla="*/ 390227 h 984858"/>
+              <a:gd name="connsiteX0" fmla="*/ 0 w 906658"/>
+              <a:gd name="connsiteY0" fmla="*/ 390227 h 984858"/>
+              <a:gd name="connsiteX1" fmla="*/ 886375 w 906658"/>
+              <a:gd name="connsiteY1" fmla="*/ 0 h 984858"/>
+              <a:gd name="connsiteX2" fmla="*/ 906658 w 906658"/>
+              <a:gd name="connsiteY2" fmla="*/ 778397 h 984858"/>
+              <a:gd name="connsiteX3" fmla="*/ 0 w 906658"/>
+              <a:gd name="connsiteY3" fmla="*/ 984858 h 984858"/>
+              <a:gd name="connsiteX4" fmla="*/ 0 w 906658"/>
+              <a:gd name="connsiteY4" fmla="*/ 390227 h 984858"/>
+              <a:gd name="connsiteX0" fmla="*/ 0 w 892371"/>
+              <a:gd name="connsiteY0" fmla="*/ 390227 h 984858"/>
+              <a:gd name="connsiteX1" fmla="*/ 886375 w 892371"/>
+              <a:gd name="connsiteY1" fmla="*/ 0 h 984858"/>
+              <a:gd name="connsiteX2" fmla="*/ 892371 w 892371"/>
+              <a:gd name="connsiteY2" fmla="*/ 778397 h 984858"/>
+              <a:gd name="connsiteX3" fmla="*/ 0 w 892371"/>
+              <a:gd name="connsiteY3" fmla="*/ 984858 h 984858"/>
+              <a:gd name="connsiteX4" fmla="*/ 0 w 892371"/>
+              <a:gd name="connsiteY4" fmla="*/ 390227 h 984858"/>
+              <a:gd name="connsiteX0" fmla="*/ 0 w 887608"/>
+              <a:gd name="connsiteY0" fmla="*/ 390227 h 984858"/>
+              <a:gd name="connsiteX1" fmla="*/ 886375 w 887608"/>
+              <a:gd name="connsiteY1" fmla="*/ 0 h 984858"/>
+              <a:gd name="connsiteX2" fmla="*/ 887608 w 887608"/>
+              <a:gd name="connsiteY2" fmla="*/ 768276 h 984858"/>
+              <a:gd name="connsiteX3" fmla="*/ 0 w 887608"/>
+              <a:gd name="connsiteY3" fmla="*/ 984858 h 984858"/>
+              <a:gd name="connsiteX4" fmla="*/ 0 w 887608"/>
+              <a:gd name="connsiteY4" fmla="*/ 390227 h 984858"/>
+              <a:gd name="connsiteX0" fmla="*/ 14287 w 901895"/>
+              <a:gd name="connsiteY0" fmla="*/ 390227 h 984858"/>
+              <a:gd name="connsiteX1" fmla="*/ 900662 w 901895"/>
+              <a:gd name="connsiteY1" fmla="*/ 0 h 984858"/>
+              <a:gd name="connsiteX2" fmla="*/ 901895 w 901895"/>
+              <a:gd name="connsiteY2" fmla="*/ 768276 h 984858"/>
+              <a:gd name="connsiteX3" fmla="*/ 0 w 901895"/>
+              <a:gd name="connsiteY3" fmla="*/ 984858 h 984858"/>
+              <a:gd name="connsiteX4" fmla="*/ 14287 w 901895"/>
+              <a:gd name="connsiteY4" fmla="*/ 390227 h 984858"/>
+              <a:gd name="connsiteX0" fmla="*/ 0 w 901895"/>
+              <a:gd name="connsiteY0" fmla="*/ 380106 h 984858"/>
+              <a:gd name="connsiteX1" fmla="*/ 900662 w 901895"/>
+              <a:gd name="connsiteY1" fmla="*/ 0 h 984858"/>
+              <a:gd name="connsiteX2" fmla="*/ 901895 w 901895"/>
+              <a:gd name="connsiteY2" fmla="*/ 768276 h 984858"/>
+              <a:gd name="connsiteX3" fmla="*/ 0 w 901895"/>
+              <a:gd name="connsiteY3" fmla="*/ 984858 h 984858"/>
+              <a:gd name="connsiteX4" fmla="*/ 0 w 901895"/>
+              <a:gd name="connsiteY4" fmla="*/ 380106 h 984858"/>
+              <a:gd name="connsiteX0" fmla="*/ 0 w 901895"/>
+              <a:gd name="connsiteY0" fmla="*/ 369985 h 984858"/>
+              <a:gd name="connsiteX1" fmla="*/ 900662 w 901895"/>
+              <a:gd name="connsiteY1" fmla="*/ 0 h 984858"/>
+              <a:gd name="connsiteX2" fmla="*/ 901895 w 901895"/>
+              <a:gd name="connsiteY2" fmla="*/ 768276 h 984858"/>
+              <a:gd name="connsiteX3" fmla="*/ 0 w 901895"/>
+              <a:gd name="connsiteY3" fmla="*/ 984858 h 984858"/>
+              <a:gd name="connsiteX4" fmla="*/ 0 w 901895"/>
+              <a:gd name="connsiteY4" fmla="*/ 369985 h 984858"/>
+            </a:gdLst>
+            <a:ahLst/>
+            <a:cxnLst>
+              <a:cxn ang="0">
+                <a:pos x="connsiteX0" y="connsiteY0"/>
+              </a:cxn>
+              <a:cxn ang="0">
+                <a:pos x="connsiteX1" y="connsiteY1"/>
+              </a:cxn>
+              <a:cxn ang="0">
+                <a:pos x="connsiteX2" y="connsiteY2"/>
+              </a:cxn>
+              <a:cxn ang="0">
+                <a:pos x="connsiteX3" y="connsiteY3"/>
+              </a:cxn>
+              <a:cxn ang="0">
+                <a:pos x="connsiteX4" y="connsiteY4"/>
+              </a:cxn>
+            </a:cxnLst>
+            <a:rect l="l" t="t" r="r" b="b"/>
+            <a:pathLst>
+              <a:path w="901895" h="984858">
+                <a:moveTo>
+                  <a:pt x="0" y="369985"/>
+                </a:moveTo>
+                <a:lnTo>
+                  <a:pt x="900662" y="0"/>
+                </a:lnTo>
+                <a:cubicBezTo>
+                  <a:pt x="902661" y="259466"/>
+                  <a:pt x="899896" y="508810"/>
+                  <a:pt x="901895" y="768276"/>
+                </a:cubicBezTo>
+                <a:lnTo>
+                  <a:pt x="0" y="984858"/>
+                </a:lnTo>
+                <a:lnTo>
+                  <a:pt x="0" y="369985"/>
+                </a:lnTo>
+                <a:close/>
+              </a:path>
+            </a:pathLst>
+          </a:custGeom>
+          <a:gradFill flip="none" rotWithShape="1">
+            <a:gsLst>
+              <a:gs pos="16000">
+                <a:schemeClr val="accent2"/>
+              </a:gs>
+              <a:gs pos="69000">
+                <a:schemeClr val="accent1">
+                  <a:tint val="44500"/>
+                  <a:satMod val="160000"/>
+                </a:schemeClr>
+              </a:gs>
+              <a:gs pos="100000">
+                <a:schemeClr val="accent1">
+                  <a:tint val="23500"/>
+                  <a:satMod val="160000"/>
+                </a:schemeClr>
+              </a:gs>
+            </a:gsLst>
+            <a:lin ang="0" scaled="1"/>
+            <a:tileRect/>
+          </a:gradFill>
+          <a:ln>
+            <a:noFill/>
+          </a:ln>
+        </p:spPr>
+        <p:style>
+          <a:lnRef idx="2">
+            <a:schemeClr val="accent1">
+              <a:shade val="50000"/>
+            </a:schemeClr>
+          </a:lnRef>
+          <a:fillRef idx="1">
+            <a:schemeClr val="accent1"/>
+          </a:fillRef>
+          <a:effectRef idx="0">
+            <a:schemeClr val="accent1"/>
+          </a:effectRef>
+          <a:fontRef idx="minor">
+            <a:schemeClr val="lt1"/>
+          </a:fontRef>
+        </p:style>
+        <p:txBody>
+          <a:bodyPr rtlCol="0" anchor="ctr"/>
+          <a:lstStyle/>
+          <a:p>
+            <a:pPr algn="ctr"/>
+            <a:endParaRPr lang="en-GB"/>
+          </a:p>
+        </p:txBody>
+      </p:sp>
+      <p:sp>
+        <p:nvSpPr>
+          <p:cNvPr id="36" name="Freeform 35"/>
+          <p:cNvSpPr/>
+          <p:nvPr/>
+        </p:nvSpPr>
+        <p:spPr>
+          <a:xfrm>
+            <a:off x="2541789" y="1949130"/>
+            <a:ext cx="882846" cy="3732924"/>
+          </a:xfrm>
+          <a:custGeom>
+            <a:avLst/>
+            <a:gdLst>
+              <a:gd name="connsiteX0" fmla="*/ 0 w 635726"/>
+              <a:gd name="connsiteY0" fmla="*/ 714103 h 6296297"/>
+              <a:gd name="connsiteX1" fmla="*/ 635726 w 635726"/>
+              <a:gd name="connsiteY1" fmla="*/ 0 h 6296297"/>
+              <a:gd name="connsiteX2" fmla="*/ 635726 w 635726"/>
+              <a:gd name="connsiteY2" fmla="*/ 6296297 h 6296297"/>
+              <a:gd name="connsiteX3" fmla="*/ 0 w 635726"/>
+              <a:gd name="connsiteY3" fmla="*/ 4859383 h 6296297"/>
+              <a:gd name="connsiteX4" fmla="*/ 0 w 635726"/>
+              <a:gd name="connsiteY4" fmla="*/ 714103 h 6296297"/>
+              <a:gd name="connsiteX0" fmla="*/ 0 w 793771"/>
+              <a:gd name="connsiteY0" fmla="*/ 726099 h 6308293"/>
+              <a:gd name="connsiteX1" fmla="*/ 793771 w 793771"/>
+              <a:gd name="connsiteY1" fmla="*/ 0 h 6308293"/>
+              <a:gd name="connsiteX2" fmla="*/ 635726 w 793771"/>
+              <a:gd name="connsiteY2" fmla="*/ 6308293 h 6308293"/>
+              <a:gd name="connsiteX3" fmla="*/ 0 w 793771"/>
+              <a:gd name="connsiteY3" fmla="*/ 4871379 h 6308293"/>
+              <a:gd name="connsiteX4" fmla="*/ 0 w 793771"/>
+              <a:gd name="connsiteY4" fmla="*/ 726099 h 6308293"/>
+              <a:gd name="connsiteX0" fmla="*/ 0 w 895371"/>
+              <a:gd name="connsiteY0" fmla="*/ 702108 h 6284302"/>
+              <a:gd name="connsiteX1" fmla="*/ 895371 w 895371"/>
+              <a:gd name="connsiteY1" fmla="*/ 0 h 6284302"/>
+              <a:gd name="connsiteX2" fmla="*/ 635726 w 895371"/>
+              <a:gd name="connsiteY2" fmla="*/ 6284302 h 6284302"/>
+              <a:gd name="connsiteX3" fmla="*/ 0 w 895371"/>
+              <a:gd name="connsiteY3" fmla="*/ 4847388 h 6284302"/>
+              <a:gd name="connsiteX4" fmla="*/ 0 w 895371"/>
+              <a:gd name="connsiteY4" fmla="*/ 702108 h 6284302"/>
+              <a:gd name="connsiteX0" fmla="*/ 11289 w 895371"/>
+              <a:gd name="connsiteY0" fmla="*/ 378231 h 6284302"/>
+              <a:gd name="connsiteX1" fmla="*/ 895371 w 895371"/>
+              <a:gd name="connsiteY1" fmla="*/ 0 h 6284302"/>
+              <a:gd name="connsiteX2" fmla="*/ 635726 w 895371"/>
+              <a:gd name="connsiteY2" fmla="*/ 6284302 h 6284302"/>
+              <a:gd name="connsiteX3" fmla="*/ 0 w 895371"/>
+              <a:gd name="connsiteY3" fmla="*/ 4847388 h 6284302"/>
+              <a:gd name="connsiteX4" fmla="*/ 11289 w 895371"/>
+              <a:gd name="connsiteY4" fmla="*/ 378231 h 6284302"/>
+              <a:gd name="connsiteX0" fmla="*/ 0 w 884082"/>
+              <a:gd name="connsiteY0" fmla="*/ 378231 h 6284302"/>
+              <a:gd name="connsiteX1" fmla="*/ 884082 w 884082"/>
+              <a:gd name="connsiteY1" fmla="*/ 0 h 6284302"/>
+              <a:gd name="connsiteX2" fmla="*/ 624437 w 884082"/>
+              <a:gd name="connsiteY2" fmla="*/ 6284302 h 6284302"/>
+              <a:gd name="connsiteX3" fmla="*/ 0 w 884082"/>
+              <a:gd name="connsiteY3" fmla="*/ 972862 h 6284302"/>
+              <a:gd name="connsiteX4" fmla="*/ 0 w 884082"/>
+              <a:gd name="connsiteY4" fmla="*/ 378231 h 6284302"/>
+              <a:gd name="connsiteX0" fmla="*/ 0 w 884082"/>
+              <a:gd name="connsiteY0" fmla="*/ 378231 h 1306196"/>
+              <a:gd name="connsiteX1" fmla="*/ 884082 w 884082"/>
+              <a:gd name="connsiteY1" fmla="*/ 0 h 1306196"/>
+              <a:gd name="connsiteX2" fmla="*/ 793770 w 884082"/>
+              <a:gd name="connsiteY2" fmla="*/ 1306196 h 1306196"/>
+              <a:gd name="connsiteX3" fmla="*/ 0 w 884082"/>
+              <a:gd name="connsiteY3" fmla="*/ 972862 h 1306196"/>
+              <a:gd name="connsiteX4" fmla="*/ 0 w 884082"/>
+              <a:gd name="connsiteY4" fmla="*/ 378231 h 1306196"/>
+              <a:gd name="connsiteX0" fmla="*/ 0 w 906658"/>
+              <a:gd name="connsiteY0" fmla="*/ 378231 h 972862"/>
+              <a:gd name="connsiteX1" fmla="*/ 884082 w 906658"/>
+              <a:gd name="connsiteY1" fmla="*/ 0 h 972862"/>
+              <a:gd name="connsiteX2" fmla="*/ 906658 w 906658"/>
+              <a:gd name="connsiteY2" fmla="*/ 766401 h 972862"/>
+              <a:gd name="connsiteX3" fmla="*/ 0 w 906658"/>
+              <a:gd name="connsiteY3" fmla="*/ 972862 h 972862"/>
+              <a:gd name="connsiteX4" fmla="*/ 0 w 906658"/>
+              <a:gd name="connsiteY4" fmla="*/ 378231 h 972862"/>
+              <a:gd name="connsiteX0" fmla="*/ 0 w 929237"/>
+              <a:gd name="connsiteY0" fmla="*/ 390227 h 984858"/>
+              <a:gd name="connsiteX1" fmla="*/ 929237 w 929237"/>
+              <a:gd name="connsiteY1" fmla="*/ 0 h 984858"/>
+              <a:gd name="connsiteX2" fmla="*/ 906658 w 929237"/>
+              <a:gd name="connsiteY2" fmla="*/ 778397 h 984858"/>
+              <a:gd name="connsiteX3" fmla="*/ 0 w 929237"/>
+              <a:gd name="connsiteY3" fmla="*/ 984858 h 984858"/>
+              <a:gd name="connsiteX4" fmla="*/ 0 w 929237"/>
+              <a:gd name="connsiteY4" fmla="*/ 390227 h 984858"/>
+              <a:gd name="connsiteX0" fmla="*/ 0 w 906658"/>
+              <a:gd name="connsiteY0" fmla="*/ 390227 h 984858"/>
+              <a:gd name="connsiteX1" fmla="*/ 886375 w 906658"/>
+              <a:gd name="connsiteY1" fmla="*/ 0 h 984858"/>
+              <a:gd name="connsiteX2" fmla="*/ 906658 w 906658"/>
+              <a:gd name="connsiteY2" fmla="*/ 778397 h 984858"/>
+              <a:gd name="connsiteX3" fmla="*/ 0 w 906658"/>
+              <a:gd name="connsiteY3" fmla="*/ 984858 h 984858"/>
+              <a:gd name="connsiteX4" fmla="*/ 0 w 906658"/>
+              <a:gd name="connsiteY4" fmla="*/ 390227 h 984858"/>
+              <a:gd name="connsiteX0" fmla="*/ 0 w 892371"/>
+              <a:gd name="connsiteY0" fmla="*/ 390227 h 984858"/>
+              <a:gd name="connsiteX1" fmla="*/ 886375 w 892371"/>
+              <a:gd name="connsiteY1" fmla="*/ 0 h 984858"/>
+              <a:gd name="connsiteX2" fmla="*/ 892371 w 892371"/>
+              <a:gd name="connsiteY2" fmla="*/ 778397 h 984858"/>
+              <a:gd name="connsiteX3" fmla="*/ 0 w 892371"/>
+              <a:gd name="connsiteY3" fmla="*/ 984858 h 984858"/>
+              <a:gd name="connsiteX4" fmla="*/ 0 w 892371"/>
+              <a:gd name="connsiteY4" fmla="*/ 390227 h 984858"/>
+              <a:gd name="connsiteX0" fmla="*/ 0 w 887608"/>
+              <a:gd name="connsiteY0" fmla="*/ 390227 h 984858"/>
+              <a:gd name="connsiteX1" fmla="*/ 886375 w 887608"/>
+              <a:gd name="connsiteY1" fmla="*/ 0 h 984858"/>
+              <a:gd name="connsiteX2" fmla="*/ 887608 w 887608"/>
+              <a:gd name="connsiteY2" fmla="*/ 768276 h 984858"/>
+              <a:gd name="connsiteX3" fmla="*/ 0 w 887608"/>
+              <a:gd name="connsiteY3" fmla="*/ 984858 h 984858"/>
+              <a:gd name="connsiteX4" fmla="*/ 0 w 887608"/>
+              <a:gd name="connsiteY4" fmla="*/ 390227 h 984858"/>
+              <a:gd name="connsiteX0" fmla="*/ 0 w 896120"/>
+              <a:gd name="connsiteY0" fmla="*/ 896285 h 1490916"/>
+              <a:gd name="connsiteX1" fmla="*/ 895900 w 896120"/>
+              <a:gd name="connsiteY1" fmla="*/ 0 h 1490916"/>
+              <a:gd name="connsiteX2" fmla="*/ 887608 w 896120"/>
+              <a:gd name="connsiteY2" fmla="*/ 1274334 h 1490916"/>
+              <a:gd name="connsiteX3" fmla="*/ 0 w 896120"/>
+              <a:gd name="connsiteY3" fmla="*/ 1490916 h 1490916"/>
+              <a:gd name="connsiteX4" fmla="*/ 0 w 896120"/>
+              <a:gd name="connsiteY4" fmla="*/ 896285 h 1490916"/>
+              <a:gd name="connsiteX0" fmla="*/ 0 w 891479"/>
+              <a:gd name="connsiteY0" fmla="*/ 901346 h 1495977"/>
+              <a:gd name="connsiteX1" fmla="*/ 891138 w 891479"/>
+              <a:gd name="connsiteY1" fmla="*/ 0 h 1495977"/>
+              <a:gd name="connsiteX2" fmla="*/ 887608 w 891479"/>
+              <a:gd name="connsiteY2" fmla="*/ 1279395 h 1495977"/>
+              <a:gd name="connsiteX3" fmla="*/ 0 w 891479"/>
+              <a:gd name="connsiteY3" fmla="*/ 1495977 h 1495977"/>
+              <a:gd name="connsiteX4" fmla="*/ 0 w 891479"/>
+              <a:gd name="connsiteY4" fmla="*/ 901346 h 1495977"/>
+              <a:gd name="connsiteX0" fmla="*/ 0 w 901896"/>
+              <a:gd name="connsiteY0" fmla="*/ 901346 h 3976684"/>
+              <a:gd name="connsiteX1" fmla="*/ 891138 w 901896"/>
+              <a:gd name="connsiteY1" fmla="*/ 0 h 3976684"/>
+              <a:gd name="connsiteX2" fmla="*/ 901896 w 901896"/>
+              <a:gd name="connsiteY2" fmla="*/ 3976684 h 3976684"/>
+              <a:gd name="connsiteX3" fmla="*/ 0 w 901896"/>
+              <a:gd name="connsiteY3" fmla="*/ 1495977 h 3976684"/>
+              <a:gd name="connsiteX4" fmla="*/ 0 w 901896"/>
+              <a:gd name="connsiteY4" fmla="*/ 901346 h 3976684"/>
+              <a:gd name="connsiteX0" fmla="*/ 0 w 892371"/>
+              <a:gd name="connsiteY0" fmla="*/ 901346 h 3966563"/>
+              <a:gd name="connsiteX1" fmla="*/ 891138 w 892371"/>
+              <a:gd name="connsiteY1" fmla="*/ 0 h 3966563"/>
+              <a:gd name="connsiteX2" fmla="*/ 892371 w 892371"/>
+              <a:gd name="connsiteY2" fmla="*/ 3966563 h 3966563"/>
+              <a:gd name="connsiteX3" fmla="*/ 0 w 892371"/>
+              <a:gd name="connsiteY3" fmla="*/ 1495977 h 3966563"/>
+              <a:gd name="connsiteX4" fmla="*/ 0 w 892371"/>
+              <a:gd name="connsiteY4" fmla="*/ 901346 h 3966563"/>
+              <a:gd name="connsiteX0" fmla="*/ 9525 w 892371"/>
+              <a:gd name="connsiteY0" fmla="*/ 208047 h 3966563"/>
+              <a:gd name="connsiteX1" fmla="*/ 891138 w 892371"/>
+              <a:gd name="connsiteY1" fmla="*/ 0 h 3966563"/>
+              <a:gd name="connsiteX2" fmla="*/ 892371 w 892371"/>
+              <a:gd name="connsiteY2" fmla="*/ 3966563 h 3966563"/>
+              <a:gd name="connsiteX3" fmla="*/ 0 w 892371"/>
+              <a:gd name="connsiteY3" fmla="*/ 1495977 h 3966563"/>
+              <a:gd name="connsiteX4" fmla="*/ 9525 w 892371"/>
+              <a:gd name="connsiteY4" fmla="*/ 208047 h 3966563"/>
+              <a:gd name="connsiteX0" fmla="*/ 14287 w 897133"/>
+              <a:gd name="connsiteY0" fmla="*/ 208047 h 3966563"/>
+              <a:gd name="connsiteX1" fmla="*/ 895900 w 897133"/>
+              <a:gd name="connsiteY1" fmla="*/ 0 h 3966563"/>
+              <a:gd name="connsiteX2" fmla="*/ 897133 w 897133"/>
+              <a:gd name="connsiteY2" fmla="*/ 3966563 h 3966563"/>
+              <a:gd name="connsiteX3" fmla="*/ 0 w 897133"/>
+              <a:gd name="connsiteY3" fmla="*/ 822920 h 3966563"/>
+              <a:gd name="connsiteX4" fmla="*/ 14287 w 897133"/>
+              <a:gd name="connsiteY4" fmla="*/ 208047 h 3966563"/>
+              <a:gd name="connsiteX0" fmla="*/ 0 w 882846"/>
+              <a:gd name="connsiteY0" fmla="*/ 208047 h 3966563"/>
+              <a:gd name="connsiteX1" fmla="*/ 881613 w 882846"/>
+              <a:gd name="connsiteY1" fmla="*/ 0 h 3966563"/>
+              <a:gd name="connsiteX2" fmla="*/ 882846 w 882846"/>
+              <a:gd name="connsiteY2" fmla="*/ 3966563 h 3966563"/>
+              <a:gd name="connsiteX3" fmla="*/ 0 w 882846"/>
+              <a:gd name="connsiteY3" fmla="*/ 822920 h 3966563"/>
+              <a:gd name="connsiteX4" fmla="*/ 0 w 882846"/>
+              <a:gd name="connsiteY4" fmla="*/ 208047 h 3966563"/>
+            </a:gdLst>
+            <a:ahLst/>
+            <a:cxnLst>
+              <a:cxn ang="0">
+                <a:pos x="connsiteX0" y="connsiteY0"/>
+              </a:cxn>
+              <a:cxn ang="0">
+                <a:pos x="connsiteX1" y="connsiteY1"/>
+              </a:cxn>
+              <a:cxn ang="0">
+                <a:pos x="connsiteX2" y="connsiteY2"/>
+              </a:cxn>
+              <a:cxn ang="0">
+                <a:pos x="connsiteX3" y="connsiteY3"/>
+              </a:cxn>
+              <a:cxn ang="0">
+                <a:pos x="connsiteX4" y="connsiteY4"/>
+              </a:cxn>
+            </a:cxnLst>
+            <a:rect l="l" t="t" r="r" b="b"/>
+            <a:pathLst>
+              <a:path w="882846" h="3966563">
+                <a:moveTo>
+                  <a:pt x="0" y="208047"/>
+                </a:moveTo>
+                <a:lnTo>
+                  <a:pt x="881613" y="0"/>
+                </a:lnTo>
+                <a:cubicBezTo>
+                  <a:pt x="883612" y="259466"/>
+                  <a:pt x="880847" y="3707097"/>
+                  <a:pt x="882846" y="3966563"/>
+                </a:cubicBezTo>
+                <a:lnTo>
+                  <a:pt x="0" y="822920"/>
+                </a:lnTo>
+                <a:lnTo>
+                  <a:pt x="0" y="208047"/>
+                </a:lnTo>
+                <a:close/>
+              </a:path>
+            </a:pathLst>
+          </a:custGeom>
+          <a:gradFill flip="none" rotWithShape="1">
+            <a:gsLst>
+              <a:gs pos="16000">
+                <a:schemeClr val="accent3"/>
+              </a:gs>
+              <a:gs pos="69000">
                 <a:schemeClr val="accent1">
                   <a:tint val="44500"/>
                   <a:satMod val="160000"/>

</xml_diff>